<commit_message>
Assignment bt Mr Charles
</commit_message>
<xml_diff>
--- a/ASSIGNMENT 3.pptx
+++ b/ASSIGNMENT 3.pptx
@@ -10,6 +10,7 @@
     <p:sldId id="258" r:id="rId4"/>
     <p:sldId id="259" r:id="rId5"/>
     <p:sldId id="260" r:id="rId6"/>
+    <p:sldId id="261" r:id="rId7"/>
   </p:sldIdLst>
   <p:sldSz cx="12192000" cy="6858000"/>
   <p:notesSz cx="6858000" cy="9144000"/>
@@ -108,6 +109,11 @@
       </a:defRPr>
     </a:lvl9pPr>
   </p:defaultTextStyle>
+  <p:extLst>
+    <p:ext uri="{EFAFB233-063F-42B5-8137-9DF3F51BA10A}">
+      <p15:sldGuideLst xmlns:p15="http://schemas.microsoft.com/office/powerpoint/2012/main"/>
+    </p:ext>
+  </p:extLst>
 </p:presentation>
 </file>
 
@@ -8562,8 +8568,8 @@
           </a:effectLst>
         </p:spPr>
       </p:pic>
-      <mc:AlternateContent xmlns:mc="http://schemas.openxmlformats.org/markup-compatibility/2006">
-        <mc:Choice xmlns:a14="http://schemas.microsoft.com/office/drawing/2010/main" Requires="a14">
+      <mc:AlternateContent xmlns:mc="http://schemas.openxmlformats.org/markup-compatibility/2006" xmlns:a14="http://schemas.microsoft.com/office/drawing/2010/main">
+        <mc:Choice Requires="a14">
           <p:sp>
             <p:nvSpPr>
               <p:cNvPr id="15" name="TextBox 14">
@@ -8795,7 +8801,7 @@
             </p:txBody>
           </p:sp>
         </mc:Choice>
-        <mc:Fallback>
+        <mc:Fallback xmlns="">
           <p:sp>
             <p:nvSpPr>
               <p:cNvPr id="15" name="TextBox 14">
@@ -8840,8 +8846,8 @@
           </p:sp>
         </mc:Fallback>
       </mc:AlternateContent>
-      <mc:AlternateContent xmlns:mc="http://schemas.openxmlformats.org/markup-compatibility/2006">
-        <mc:Choice xmlns:a14="http://schemas.microsoft.com/office/drawing/2010/main" Requires="a14">
+      <mc:AlternateContent xmlns:mc="http://schemas.openxmlformats.org/markup-compatibility/2006" xmlns:a14="http://schemas.microsoft.com/office/drawing/2010/main">
+        <mc:Choice Requires="a14">
           <p:sp>
             <p:nvSpPr>
               <p:cNvPr id="17" name="TextBox 16">
@@ -9066,7 +9072,7 @@
             </p:txBody>
           </p:sp>
         </mc:Choice>
-        <mc:Fallback>
+        <mc:Fallback xmlns="">
           <p:sp>
             <p:nvSpPr>
               <p:cNvPr id="17" name="TextBox 16">
@@ -9141,8 +9147,8 @@
           <a:chExt cx="0" cy="0"/>
         </a:xfrm>
       </p:grpSpPr>
-      <mc:AlternateContent xmlns:mc="http://schemas.openxmlformats.org/markup-compatibility/2006">
-        <mc:Choice xmlns:a14="http://schemas.microsoft.com/office/drawing/2010/main" Requires="a14">
+      <mc:AlternateContent xmlns:mc="http://schemas.openxmlformats.org/markup-compatibility/2006" xmlns:a14="http://schemas.microsoft.com/office/drawing/2010/main">
+        <mc:Choice Requires="a14">
           <p:sp>
             <p:nvSpPr>
               <p:cNvPr id="2" name="Title 1">
@@ -9230,7 +9236,7 @@
             </p:txBody>
           </p:sp>
         </mc:Choice>
-        <mc:Fallback>
+        <mc:Fallback xmlns="">
           <p:sp>
             <p:nvSpPr>
               <p:cNvPr id="2" name="Title 1">
@@ -9521,8 +9527,8 @@
           </a:p>
         </p:txBody>
       </p:sp>
-      <mc:AlternateContent xmlns:mc="http://schemas.openxmlformats.org/markup-compatibility/2006">
-        <mc:Choice xmlns:a14="http://schemas.microsoft.com/office/drawing/2010/main" Requires="a14">
+      <mc:AlternateContent xmlns:mc="http://schemas.openxmlformats.org/markup-compatibility/2006" xmlns:a14="http://schemas.microsoft.com/office/drawing/2010/main">
+        <mc:Choice Requires="a14">
           <p:sp>
             <p:nvSpPr>
               <p:cNvPr id="15" name="TextBox 14">
@@ -9620,16 +9626,7 @@
                               </a:solidFill>
                               <a:latin typeface="Cambria Math" panose="02040503050406030204" pitchFamily="18" charset="0"/>
                             </a:rPr>
-                            <m:t>−</m:t>
-                          </m:r>
-                          <m:r>
-                            <a:rPr lang="en-US" b="1" i="1" smtClean="0">
-                              <a:solidFill>
-                                <a:srgbClr val="FF0000"/>
-                              </a:solidFill>
-                              <a:latin typeface="Cambria Math" panose="02040503050406030204" pitchFamily="18" charset="0"/>
-                            </a:rPr>
-                            <m:t>(−</m:t>
+                            <m:t>−(−</m:t>
                           </m:r>
                           <m:r>
                             <a:rPr lang="en-US" b="1" i="1" smtClean="0">
@@ -9833,7 +9830,7 @@
             </p:txBody>
           </p:sp>
         </mc:Choice>
-        <mc:Fallback>
+        <mc:Fallback xmlns="">
           <p:sp>
             <p:nvSpPr>
               <p:cNvPr id="15" name="TextBox 14">
@@ -9927,8 +9924,8 @@
           </a:p>
         </p:txBody>
       </p:sp>
-      <mc:AlternateContent xmlns:mc="http://schemas.openxmlformats.org/markup-compatibility/2006">
-        <mc:Choice xmlns:a14="http://schemas.microsoft.com/office/drawing/2010/main" Requires="a14">
+      <mc:AlternateContent xmlns:mc="http://schemas.openxmlformats.org/markup-compatibility/2006" xmlns:a14="http://schemas.microsoft.com/office/drawing/2010/main">
+        <mc:Choice Requires="a14">
           <p:sp>
             <p:nvSpPr>
               <p:cNvPr id="17" name="TextBox 16">
@@ -10246,7 +10243,7 @@
             </p:txBody>
           </p:sp>
         </mc:Choice>
-        <mc:Fallback>
+        <mc:Fallback xmlns="">
           <p:sp>
             <p:nvSpPr>
               <p:cNvPr id="17" name="TextBox 16">
@@ -10295,6 +10292,306 @@
     <p:extLst>
       <p:ext uri="{BB962C8B-B14F-4D97-AF65-F5344CB8AC3E}">
         <p14:creationId xmlns:p14="http://schemas.microsoft.com/office/powerpoint/2010/main" val="2782355337"/>
+      </p:ext>
+    </p:extLst>
+  </p:cSld>
+  <p:clrMapOvr>
+    <a:masterClrMapping/>
+  </p:clrMapOvr>
+</p:sld>
+</file>
+
+<file path=ppt/slides/slide6.xml><?xml version="1.0" encoding="utf-8"?>
+<p:sld xmlns:a="http://schemas.openxmlformats.org/drawingml/2006/main" xmlns:r="http://schemas.openxmlformats.org/officeDocument/2006/relationships" xmlns:p="http://schemas.openxmlformats.org/presentationml/2006/main">
+  <p:cSld>
+    <p:bg>
+      <p:bgPr>
+        <a:gradFill rotWithShape="1">
+          <a:gsLst>
+            <a:gs pos="0">
+              <a:schemeClr val="bg2">
+                <a:tint val="96000"/>
+                <a:shade val="100000"/>
+                <a:hueMod val="270000"/>
+                <a:satMod val="200000"/>
+                <a:lumMod val="128000"/>
+              </a:schemeClr>
+            </a:gs>
+            <a:gs pos="50000">
+              <a:schemeClr val="bg2">
+                <a:shade val="100000"/>
+                <a:hueMod val="100000"/>
+                <a:satMod val="110000"/>
+                <a:lumMod val="130000"/>
+              </a:schemeClr>
+            </a:gs>
+            <a:gs pos="100000">
+              <a:schemeClr val="bg2">
+                <a:shade val="78000"/>
+                <a:hueMod val="44000"/>
+                <a:satMod val="200000"/>
+                <a:lumMod val="69000"/>
+              </a:schemeClr>
+            </a:gs>
+          </a:gsLst>
+          <a:lin ang="2520000" scaled="0"/>
+        </a:gradFill>
+        <a:effectLst/>
+      </p:bgPr>
+    </p:bg>
+    <p:spTree>
+      <p:nvGrpSpPr>
+        <p:cNvPr id="1" name=""/>
+        <p:cNvGrpSpPr/>
+        <p:nvPr/>
+      </p:nvGrpSpPr>
+      <p:grpSpPr>
+        <a:xfrm>
+          <a:off x="0" y="0"/>
+          <a:ext cx="0" cy="0"/>
+          <a:chOff x="0" y="0"/>
+          <a:chExt cx="0" cy="0"/>
+        </a:xfrm>
+      </p:grpSpPr>
+      <p:sp>
+        <p:nvSpPr>
+          <p:cNvPr id="11" name="Rectangle 10">
+            <a:extLst>
+              <a:ext uri="{FF2B5EF4-FFF2-40B4-BE49-F238E27FC236}">
+                <a16:creationId xmlns:a16="http://schemas.microsoft.com/office/drawing/2014/main" id="{355C2497-A31D-411B-B7CC-5CB04199A41F}"/>
+              </a:ext>
+              <a:ext uri="{C183D7F6-B498-43B3-948B-1728B52AA6E4}">
+                <adec:decorative xmlns:adec="http://schemas.microsoft.com/office/drawing/2017/decorative" val="1"/>
+              </a:ext>
+            </a:extLst>
+          </p:cNvPr>
+          <p:cNvSpPr>
+            <a:spLocks noGrp="1" noRot="1" noChangeAspect="1" noMove="1" noResize="1" noEditPoints="1" noAdjustHandles="1" noChangeArrowheads="1" noChangeShapeType="1" noTextEdit="1"/>
+          </p:cNvSpPr>
+          <p:nvPr>
+            <p:extLst>
+              <p:ext uri="{386F3935-93C4-4BCD-93E2-E3B085C9AB24}">
+                <p16:designElem xmlns:p16="http://schemas.microsoft.com/office/powerpoint/2015/main" val="1"/>
+              </p:ext>
+            </p:extLst>
+          </p:nvPr>
+        </p:nvSpPr>
+        <p:spPr>
+          <a:xfrm>
+            <a:off x="634277" y="609600"/>
+            <a:ext cx="9659904" cy="5604933"/>
+          </a:xfrm>
+          <a:prstGeom prst="rect">
+            <a:avLst/>
+          </a:prstGeom>
+          <a:solidFill>
+            <a:srgbClr val="FFFFFF"/>
+          </a:solidFill>
+          <a:ln>
+            <a:noFill/>
+          </a:ln>
+          <a:effectLst>
+            <a:outerShdw blurRad="76200" dist="63500" dir="5040000" algn="ctr" rotWithShape="0">
+              <a:srgbClr val="000000">
+                <a:alpha val="41000"/>
+              </a:srgbClr>
+            </a:outerShdw>
+          </a:effectLst>
+        </p:spPr>
+        <p:style>
+          <a:lnRef idx="2">
+            <a:schemeClr val="accent1">
+              <a:shade val="50000"/>
+            </a:schemeClr>
+          </a:lnRef>
+          <a:fillRef idx="1">
+            <a:schemeClr val="accent1"/>
+          </a:fillRef>
+          <a:effectRef idx="0">
+            <a:schemeClr val="accent1"/>
+          </a:effectRef>
+          <a:fontRef idx="minor">
+            <a:schemeClr val="lt1"/>
+          </a:fontRef>
+        </p:style>
+        <p:txBody>
+          <a:bodyPr rtlCol="0" anchor="ctr"/>
+          <a:lstStyle/>
+          <a:p>
+            <a:pPr algn="ctr"/>
+            <a:endParaRPr lang="en-US"/>
+          </a:p>
+        </p:txBody>
+      </p:sp>
+      <p:pic>
+        <p:nvPicPr>
+          <p:cNvPr id="6" name="Picture 5" descr="Text&#10;&#10;Description automatically generated">
+            <a:extLst>
+              <a:ext uri="{FF2B5EF4-FFF2-40B4-BE49-F238E27FC236}">
+                <a16:creationId xmlns:a16="http://schemas.microsoft.com/office/drawing/2014/main" id="{E70712BF-1758-4B1A-8FDB-B0AED17DF64B}"/>
+              </a:ext>
+            </a:extLst>
+          </p:cNvPr>
+          <p:cNvPicPr>
+            <a:picLocks noChangeAspect="1"/>
+          </p:cNvPicPr>
+          <p:nvPr/>
+        </p:nvPicPr>
+        <p:blipFill rotWithShape="1">
+          <a:blip r:embed="rId2"/>
+          <a:srcRect b="852"/>
+          <a:stretch/>
+        </p:blipFill>
+        <p:spPr>
+          <a:xfrm>
+            <a:off x="956009" y="931333"/>
+            <a:ext cx="9016437" cy="4961466"/>
+          </a:xfrm>
+          <a:prstGeom prst="snip2DiagRect">
+            <a:avLst/>
+          </a:prstGeom>
+          <a:solidFill>
+            <a:srgbClr val="FFFFFF">
+              <a:shade val="85000"/>
+            </a:srgbClr>
+          </a:solidFill>
+          <a:ln w="88900" cap="sq">
+            <a:solidFill>
+              <a:srgbClr val="FFFFFF"/>
+            </a:solidFill>
+            <a:miter lim="800000"/>
+          </a:ln>
+          <a:effectLst>
+            <a:glow rad="228600">
+              <a:schemeClr val="accent4">
+                <a:satMod val="175000"/>
+                <a:alpha val="40000"/>
+              </a:schemeClr>
+            </a:glow>
+            <a:outerShdw blurRad="88900" algn="tl" rotWithShape="0">
+              <a:srgbClr val="000000">
+                <a:alpha val="45000"/>
+              </a:srgbClr>
+            </a:outerShdw>
+          </a:effectLst>
+          <a:scene3d>
+            <a:camera prst="orthographicFront"/>
+            <a:lightRig rig="twoPt" dir="t">
+              <a:rot lat="0" lon="0" rev="7200000"/>
+            </a:lightRig>
+          </a:scene3d>
+          <a:sp3d>
+            <a:bevelT w="25400" h="19050"/>
+            <a:contourClr>
+              <a:srgbClr val="FFFFFF"/>
+            </a:contourClr>
+          </a:sp3d>
+        </p:spPr>
+      </p:pic>
+      <p:pic>
+        <p:nvPicPr>
+          <p:cNvPr id="13" name="Picture 12">
+            <a:extLst>
+              <a:ext uri="{FF2B5EF4-FFF2-40B4-BE49-F238E27FC236}">
+                <a16:creationId xmlns:a16="http://schemas.microsoft.com/office/drawing/2014/main" id="{1702A4D1-2C2E-40B4-9C63-D31CDB407FE4}"/>
+              </a:ext>
+              <a:ext uri="{C183D7F6-B498-43B3-948B-1728B52AA6E4}">
+                <adec:decorative xmlns:adec="http://schemas.microsoft.com/office/drawing/2017/decorative" val="1"/>
+              </a:ext>
+            </a:extLst>
+          </p:cNvPr>
+          <p:cNvPicPr>
+            <a:picLocks noGrp="1" noRot="1" noChangeAspect="1" noMove="1" noResize="1" noEditPoints="1" noAdjustHandles="1" noChangeArrowheads="1" noChangeShapeType="1" noCrop="1"/>
+          </p:cNvPicPr>
+          <p:nvPr>
+            <p:extLst>
+              <p:ext uri="{386F3935-93C4-4BCD-93E2-E3B085C9AB24}">
+                <p16:designElem xmlns:p16="http://schemas.microsoft.com/office/powerpoint/2015/main" val="1"/>
+              </p:ext>
+            </p:extLst>
+          </p:nvPr>
+        </p:nvPicPr>
+        <p:blipFill>
+          <a:blip r:embed="rId3">
+            <a:extLst>
+              <a:ext uri="{28A0092B-C50C-407E-A947-70E740481C1C}">
+                <a14:useLocalDpi xmlns:a14="http://schemas.microsoft.com/office/drawing/2010/main" val="0"/>
+              </a:ext>
+            </a:extLst>
+          </a:blip>
+          <a:stretch>
+            <a:fillRect/>
+          </a:stretch>
+        </p:blipFill>
+        <p:spPr>
+          <a:xfrm>
+            <a:off x="10585826" y="1971234"/>
+            <a:ext cx="1602997" cy="144270"/>
+          </a:xfrm>
+          <a:prstGeom prst="rect">
+            <a:avLst/>
+          </a:prstGeom>
+        </p:spPr>
+      </p:pic>
+      <p:sp>
+        <p:nvSpPr>
+          <p:cNvPr id="15" name="Rectangle 14">
+            <a:extLst>
+              <a:ext uri="{FF2B5EF4-FFF2-40B4-BE49-F238E27FC236}">
+                <a16:creationId xmlns:a16="http://schemas.microsoft.com/office/drawing/2014/main" id="{77C4A954-C4D8-4B3C-8268-C93B77D49D8D}"/>
+              </a:ext>
+              <a:ext uri="{C183D7F6-B498-43B3-948B-1728B52AA6E4}">
+                <adec:decorative xmlns:adec="http://schemas.microsoft.com/office/drawing/2017/decorative" val="1"/>
+              </a:ext>
+            </a:extLst>
+          </p:cNvPr>
+          <p:cNvSpPr>
+            <a:spLocks noGrp="1" noRot="1" noChangeAspect="1" noMove="1" noResize="1" noEditPoints="1" noAdjustHandles="1" noChangeArrowheads="1" noChangeShapeType="1" noTextEdit="1"/>
+          </p:cNvSpPr>
+          <p:nvPr>
+            <p:extLst>
+              <p:ext uri="{386F3935-93C4-4BCD-93E2-E3B085C9AB24}">
+                <p16:designElem xmlns:p16="http://schemas.microsoft.com/office/powerpoint/2015/main" val="1"/>
+              </p:ext>
+            </p:extLst>
+          </p:nvPr>
+        </p:nvSpPr>
+        <p:spPr>
+          <a:xfrm>
+            <a:off x="10585827" y="609600"/>
+            <a:ext cx="1602997" cy="1368198"/>
+          </a:xfrm>
+          <a:prstGeom prst="rect">
+            <a:avLst/>
+          </a:prstGeom>
+          <a:solidFill>
+            <a:schemeClr val="accent1"/>
+          </a:solidFill>
+          <a:ln>
+            <a:noFill/>
+          </a:ln>
+        </p:spPr>
+        <p:style>
+          <a:lnRef idx="2">
+            <a:schemeClr val="accent1">
+              <a:shade val="50000"/>
+            </a:schemeClr>
+          </a:lnRef>
+          <a:fillRef idx="1">
+            <a:schemeClr val="accent1"/>
+          </a:fillRef>
+          <a:effectRef idx="0">
+            <a:schemeClr val="accent1"/>
+          </a:effectRef>
+          <a:fontRef idx="minor">
+            <a:schemeClr val="lt1"/>
+          </a:fontRef>
+        </p:style>
+      </p:sp>
+    </p:spTree>
+    <p:extLst>
+      <p:ext uri="{BB962C8B-B14F-4D97-AF65-F5344CB8AC3E}">
+        <p14:creationId xmlns:p14="http://schemas.microsoft.com/office/powerpoint/2010/main" val="820857883"/>
       </p:ext>
     </p:extLst>
   </p:cSld>

</xml_diff>